<commit_message>
Refresh and add slides
</commit_message>
<xml_diff>
--- a/slides/01.01-intelligent-apps.pptx
+++ b/slides/01.01-intelligent-apps.pptx
@@ -4244,7 +4244,7 @@
                 <a:tabLst/>
                 <a:defRPr/>
               </a:pPr>
-              <a:t>10/17/2017 2:10 PM</a:t>
+              <a:t>10/17/2017 2:25 PM</a:t>
             </a:fld>
             <a:endParaRPr kumimoji="0" lang="en-US" sz="1200" b="0" i="0" u="none" strike="noStrike" kern="1200" cap="none" spc="0" normalizeH="0" baseline="0" noProof="0">
               <a:ln>
@@ -4403,58 +4403,6 @@
           <a:bodyPr/>
           <a:lstStyle/>
           <a:p>
-            <a:r>
-              <a:rPr lang="de-AT" dirty="0" err="1"/>
-              <a:t>Speak</a:t>
-            </a:r>
-            <a:r>
-              <a:rPr lang="de-AT" dirty="0"/>
-              <a:t> </a:t>
-            </a:r>
-            <a:r>
-              <a:rPr lang="de-AT" dirty="0" err="1"/>
-              <a:t>about</a:t>
-            </a:r>
-            <a:r>
-              <a:rPr lang="de-AT" dirty="0"/>
-              <a:t> </a:t>
-            </a:r>
-            <a:r>
-              <a:rPr lang="de-AT" dirty="0" err="1"/>
-              <a:t>how</a:t>
-            </a:r>
-            <a:r>
-              <a:rPr lang="de-AT" dirty="0"/>
-              <a:t> Microsoft </a:t>
-            </a:r>
-            <a:r>
-              <a:rPr lang="de-AT" dirty="0" err="1"/>
-              <a:t>is</a:t>
-            </a:r>
-            <a:r>
-              <a:rPr lang="de-AT" dirty="0"/>
-              <a:t> </a:t>
-            </a:r>
-            <a:r>
-              <a:rPr lang="de-AT" dirty="0" err="1"/>
-              <a:t>changing</a:t>
-            </a:r>
-            <a:r>
-              <a:rPr lang="de-AT" dirty="0"/>
-              <a:t> </a:t>
-            </a:r>
-            <a:r>
-              <a:rPr lang="de-AT" dirty="0" err="1"/>
-              <a:t>towards</a:t>
-            </a:r>
-            <a:r>
-              <a:rPr lang="de-AT" dirty="0"/>
-              <a:t> Open Source and Cross </a:t>
-            </a:r>
-            <a:r>
-              <a:rPr lang="de-AT" dirty="0" err="1"/>
-              <a:t>Platform</a:t>
-            </a:r>
             <a:endParaRPr lang="de-AT" dirty="0"/>
           </a:p>
         </p:txBody>
@@ -4557,50 +4505,6 @@
               <a:tabLst/>
               <a:defRPr/>
             </a:pPr>
-            <a:r>
-              <a:rPr lang="de-AT" dirty="0" err="1"/>
-              <a:t>If</a:t>
-            </a:r>
-            <a:r>
-              <a:rPr lang="de-AT" dirty="0"/>
-              <a:t> </a:t>
-            </a:r>
-            <a:r>
-              <a:rPr lang="de-AT" dirty="0" err="1"/>
-              <a:t>you</a:t>
-            </a:r>
-            <a:r>
-              <a:rPr lang="de-AT" dirty="0"/>
-              <a:t> </a:t>
-            </a:r>
-            <a:r>
-              <a:rPr lang="de-AT" dirty="0" err="1"/>
-              <a:t>have</a:t>
-            </a:r>
-            <a:r>
-              <a:rPr lang="de-AT" dirty="0"/>
-              <a:t> time, </a:t>
-            </a:r>
-            <a:r>
-              <a:rPr lang="de-AT" dirty="0" err="1"/>
-              <a:t>show</a:t>
-            </a:r>
-            <a:r>
-              <a:rPr lang="de-AT" dirty="0"/>
-              <a:t> quick </a:t>
-            </a:r>
-            <a:r>
-              <a:rPr lang="de-AT" dirty="0" err="1"/>
-              <a:t>demos</a:t>
-            </a:r>
-            <a:r>
-              <a:rPr lang="de-AT" dirty="0"/>
-              <a:t> </a:t>
-            </a:r>
-            <a:r>
-              <a:rPr lang="en-US" dirty="0"/>
-              <a:t>for the areas of change mentioned on the previous slide</a:t>
-            </a:r>
             <a:endParaRPr lang="de-AT" dirty="0"/>
           </a:p>
         </p:txBody>
@@ -4778,7 +4682,7 @@
                 <a:tabLst/>
                 <a:defRPr/>
               </a:pPr>
-              <a:t>10/17/2017 2:10 PM</a:t>
+              <a:t>10/17/2017 2:25 PM</a:t>
             </a:fld>
             <a:endParaRPr kumimoji="0" lang="en-US" sz="1200" b="0" i="0" u="none" strike="noStrike" kern="1200" cap="none" spc="0" normalizeH="0" baseline="0" noProof="0">
               <a:ln>
@@ -5199,7 +5103,7 @@
                 <a:tabLst/>
                 <a:defRPr/>
               </a:pPr>
-              <a:t>10/17/2017 2:11 PM</a:t>
+              <a:t>10/17/2017 2:25 PM</a:t>
             </a:fld>
             <a:endParaRPr kumimoji="0" lang="en-US" sz="1200" b="0" i="0" u="none" strike="noStrike" kern="1200" cap="none" spc="0" normalizeH="0" baseline="0" noProof="0">
               <a:ln>
@@ -33425,14 +33329,14 @@
           <p:nvPr/>
         </p:nvPicPr>
         <p:blipFill rotWithShape="1">
-          <a:blip r:embed="rId2">
+          <a:blip r:embed="rId2" cstate="print">
             <a:extLst>
               <a:ext uri="{28A0092B-C50C-407E-A947-70E740481C1C}">
                 <a14:useLocalDpi xmlns:a14="http://schemas.microsoft.com/office/drawing/2010/main" val="0"/>
               </a:ext>
             </a:extLst>
           </a:blip>
-          <a:srcRect t="10334"/>
+          <a:srcRect/>
           <a:stretch/>
         </p:blipFill>
         <p:spPr>

</xml_diff>